<commit_message>
changed location clue and display
</commit_message>
<xml_diff>
--- a/Game_Resources/Riddles_Blue_Red.pptx
+++ b/Game_Resources/Riddles_Blue_Red.pptx
@@ -241,7 +241,7 @@
           <a:p>
             <a:fld id="{8C1B37EC-77CD-4B69-94E1-640C17F3BE4A}" type="datetimeFigureOut">
               <a:rPr lang="en-US" smtClean="0"/>
-              <a:t>7/13/2018</a:t>
+              <a:t>7/28/2018</a:t>
             </a:fld>
             <a:endParaRPr lang="en-US"/>
           </a:p>
@@ -409,7 +409,7 @@
           <a:p>
             <a:fld id="{8C1B37EC-77CD-4B69-94E1-640C17F3BE4A}" type="datetimeFigureOut">
               <a:rPr lang="en-US" smtClean="0"/>
-              <a:t>7/13/2018</a:t>
+              <a:t>7/28/2018</a:t>
             </a:fld>
             <a:endParaRPr lang="en-US"/>
           </a:p>
@@ -587,7 +587,7 @@
           <a:p>
             <a:fld id="{8C1B37EC-77CD-4B69-94E1-640C17F3BE4A}" type="datetimeFigureOut">
               <a:rPr lang="en-US" smtClean="0"/>
-              <a:t>7/13/2018</a:t>
+              <a:t>7/28/2018</a:t>
             </a:fld>
             <a:endParaRPr lang="en-US"/>
           </a:p>
@@ -755,7 +755,7 @@
           <a:p>
             <a:fld id="{8C1B37EC-77CD-4B69-94E1-640C17F3BE4A}" type="datetimeFigureOut">
               <a:rPr lang="en-US" smtClean="0"/>
-              <a:t>7/13/2018</a:t>
+              <a:t>7/28/2018</a:t>
             </a:fld>
             <a:endParaRPr lang="en-US"/>
           </a:p>
@@ -1000,7 +1000,7 @@
           <a:p>
             <a:fld id="{8C1B37EC-77CD-4B69-94E1-640C17F3BE4A}" type="datetimeFigureOut">
               <a:rPr lang="en-US" smtClean="0"/>
-              <a:t>7/13/2018</a:t>
+              <a:t>7/28/2018</a:t>
             </a:fld>
             <a:endParaRPr lang="en-US"/>
           </a:p>
@@ -1229,7 +1229,7 @@
           <a:p>
             <a:fld id="{8C1B37EC-77CD-4B69-94E1-640C17F3BE4A}" type="datetimeFigureOut">
               <a:rPr lang="en-US" smtClean="0"/>
-              <a:t>7/13/2018</a:t>
+              <a:t>7/28/2018</a:t>
             </a:fld>
             <a:endParaRPr lang="en-US"/>
           </a:p>
@@ -1593,7 +1593,7 @@
           <a:p>
             <a:fld id="{8C1B37EC-77CD-4B69-94E1-640C17F3BE4A}" type="datetimeFigureOut">
               <a:rPr lang="en-US" smtClean="0"/>
-              <a:t>7/13/2018</a:t>
+              <a:t>7/28/2018</a:t>
             </a:fld>
             <a:endParaRPr lang="en-US"/>
           </a:p>
@@ -1710,7 +1710,7 @@
           <a:p>
             <a:fld id="{8C1B37EC-77CD-4B69-94E1-640C17F3BE4A}" type="datetimeFigureOut">
               <a:rPr lang="en-US" smtClean="0"/>
-              <a:t>7/13/2018</a:t>
+              <a:t>7/28/2018</a:t>
             </a:fld>
             <a:endParaRPr lang="en-US"/>
           </a:p>
@@ -1805,7 +1805,7 @@
           <a:p>
             <a:fld id="{8C1B37EC-77CD-4B69-94E1-640C17F3BE4A}" type="datetimeFigureOut">
               <a:rPr lang="en-US" smtClean="0"/>
-              <a:t>7/13/2018</a:t>
+              <a:t>7/28/2018</a:t>
             </a:fld>
             <a:endParaRPr lang="en-US"/>
           </a:p>
@@ -2080,7 +2080,7 @@
           <a:p>
             <a:fld id="{8C1B37EC-77CD-4B69-94E1-640C17F3BE4A}" type="datetimeFigureOut">
               <a:rPr lang="en-US" smtClean="0"/>
-              <a:t>7/13/2018</a:t>
+              <a:t>7/28/2018</a:t>
             </a:fld>
             <a:endParaRPr lang="en-US"/>
           </a:p>
@@ -2332,7 +2332,7 @@
           <a:p>
             <a:fld id="{8C1B37EC-77CD-4B69-94E1-640C17F3BE4A}" type="datetimeFigureOut">
               <a:rPr lang="en-US" smtClean="0"/>
-              <a:t>7/13/2018</a:t>
+              <a:t>7/28/2018</a:t>
             </a:fld>
             <a:endParaRPr lang="en-US"/>
           </a:p>
@@ -2543,7 +2543,7 @@
           <a:p>
             <a:fld id="{8C1B37EC-77CD-4B69-94E1-640C17F3BE4A}" type="datetimeFigureOut">
               <a:rPr lang="en-US" smtClean="0"/>
-              <a:t>7/13/2018</a:t>
+              <a:t>7/28/2018</a:t>
             </a:fld>
             <a:endParaRPr lang="en-US"/>
           </a:p>
@@ -2964,7 +2964,7 @@
             <a:ext cx="8549640" cy="2258568"/>
           </a:xfrm>
           <a:solidFill>
-            <a:srgbClr val="2C0EE2"/>
+            <a:srgbClr val="FF0000"/>
           </a:solidFill>
         </p:spPr>
         <p:txBody>
@@ -2974,18 +2974,9 @@
           <a:lstStyle/>
           <a:p>
             <a:r>
-              <a:rPr lang="en-US" sz="8000">
-                <a:solidFill>
-                  <a:schemeClr val="bg1"/>
-                </a:solidFill>
-              </a:rPr>
+              <a:rPr lang="en-US" sz="8000" dirty="0"/>
               <a:t>NSNRIEF-NVO-EEU-</a:t>
             </a:r>
-            <a:endParaRPr lang="en-US" sz="8000" dirty="0">
-              <a:solidFill>
-                <a:schemeClr val="bg1"/>
-              </a:solidFill>
-            </a:endParaRPr>
           </a:p>
         </p:txBody>
       </p:sp>
@@ -2999,14 +2990,14 @@
         </p:nvSpPr>
         <p:spPr>
           <a:xfrm>
-            <a:off x="2147454" y="3327858"/>
+            <a:off x="2161307" y="3327858"/>
             <a:ext cx="8551025" cy="2258294"/>
           </a:xfrm>
           <a:prstGeom prst="rect">
             <a:avLst/>
           </a:prstGeom>
           <a:solidFill>
-            <a:srgbClr val="FF0000"/>
+            <a:srgbClr val="2C0EE2"/>
           </a:solidFill>
         </p:spPr>
         <p:txBody>
@@ -3034,43 +3025,16 @@
           </a:lstStyle>
           <a:p>
             <a:r>
-              <a:rPr lang="en-US" sz="15000" dirty="0"/>
+              <a:rPr lang="en-US" sz="15000" dirty="0">
+                <a:solidFill>
+                  <a:schemeClr val="bg1"/>
+                </a:solidFill>
+              </a:rPr>
               <a:t>E    	E	  	E</a:t>
             </a:r>
           </a:p>
         </p:txBody>
       </p:sp>
-      <p:cxnSp>
-        <p:nvCxnSpPr>
-          <p:cNvPr id="7" name="Straight Connector 6"/>
-          <p:cNvCxnSpPr/>
-          <p:nvPr/>
-        </p:nvCxnSpPr>
-        <p:spPr>
-          <a:xfrm>
-            <a:off x="3973484" y="3823855"/>
-            <a:ext cx="0" cy="633150"/>
-          </a:xfrm>
-          <a:prstGeom prst="line">
-            <a:avLst/>
-          </a:prstGeom>
-          <a:ln w="76200"/>
-        </p:spPr>
-        <p:style>
-          <a:lnRef idx="1">
-            <a:schemeClr val="dk1"/>
-          </a:lnRef>
-          <a:fillRef idx="0">
-            <a:schemeClr val="dk1"/>
-          </a:fillRef>
-          <a:effectRef idx="0">
-            <a:schemeClr val="dk1"/>
-          </a:effectRef>
-          <a:fontRef idx="minor">
-            <a:schemeClr val="tx1"/>
-          </a:fontRef>
-        </p:style>
-      </p:cxnSp>
       <p:cxnSp>
         <p:nvCxnSpPr>
           <p:cNvPr id="19" name="Straight Connector 18"/>
@@ -3085,7 +3049,11 @@
           <a:prstGeom prst="line">
             <a:avLst/>
           </a:prstGeom>
-          <a:ln w="76200"/>
+          <a:ln w="76200">
+            <a:solidFill>
+              <a:schemeClr val="bg1"/>
+            </a:solidFill>
+          </a:ln>
         </p:spPr>
         <p:style>
           <a:lnRef idx="1">
@@ -3110,13 +3078,17 @@
         </p:nvCxnSpPr>
         <p:spPr>
           <a:xfrm>
-            <a:off x="9470957" y="4350329"/>
+            <a:off x="9480384" y="4359756"/>
             <a:ext cx="0" cy="633150"/>
           </a:xfrm>
           <a:prstGeom prst="line">
             <a:avLst/>
           </a:prstGeom>
-          <a:ln w="76200"/>
+          <a:ln w="76200">
+            <a:solidFill>
+              <a:schemeClr val="bg1"/>
+            </a:solidFill>
+          </a:ln>
         </p:spPr>
         <p:style>
           <a:lnRef idx="1">
@@ -3147,7 +3119,11 @@
           <a:prstGeom prst="line">
             <a:avLst/>
           </a:prstGeom>
-          <a:ln w="76200"/>
+          <a:ln w="76200">
+            <a:solidFill>
+              <a:schemeClr val="bg1"/>
+            </a:solidFill>
+          </a:ln>
         </p:spPr>
         <p:style>
           <a:lnRef idx="1">

</xml_diff>